<commit_message>
Update 046_1.1.0_Move Current NTDP - Build NTDP Track Set Up - Form - BBB.pptx
</commit_message>
<xml_diff>
--- a/Stories/046_1.1.0_Move Current NTDP - Build NTDP Track Set Up - Form - BBB.pptx
+++ b/Stories/046_1.1.0_Move Current NTDP - Build NTDP Track Set Up - Form - BBB.pptx
@@ -5,7 +5,7 @@
     <p:sldMasterId id="2147483648" r:id="rId1"/>
   </p:sldMasterIdLst>
   <p:notesMasterIdLst>
-    <p:notesMasterId r:id="rId11"/>
+    <p:notesMasterId r:id="rId10"/>
   </p:notesMasterIdLst>
   <p:sldIdLst>
     <p:sldId id="293" r:id="rId2"/>
@@ -16,7 +16,6 @@
     <p:sldId id="298" r:id="rId7"/>
     <p:sldId id="299" r:id="rId8"/>
     <p:sldId id="300" r:id="rId9"/>
-    <p:sldId id="286" r:id="rId10"/>
   </p:sldIdLst>
   <p:sldSz cx="12192000" cy="6858000"/>
   <p:notesSz cx="6858000" cy="9144000"/>
@@ -205,7 +204,7 @@
           <a:p>
             <a:fld id="{A970648E-D0A4-46EC-8809-0411E8C03036}" type="datetimeFigureOut">
               <a:rPr lang="en-US" smtClean="0"/>
-              <a:t>12/10/2024</a:t>
+              <a:t>1/8/2025</a:t>
             </a:fld>
             <a:endParaRPr lang="en-US"/>
           </a:p>
@@ -763,7 +762,7 @@
           <a:p>
             <a:fld id="{19F71C68-41E2-44A8-86D1-43B63FB46CF2}" type="datetimeFigureOut">
               <a:rPr lang="en-US" smtClean="0"/>
-              <a:t>12/10/2024</a:t>
+              <a:t>1/8/2025</a:t>
             </a:fld>
             <a:endParaRPr lang="en-US"/>
           </a:p>
@@ -961,7 +960,7 @@
           <a:p>
             <a:fld id="{19F71C68-41E2-44A8-86D1-43B63FB46CF2}" type="datetimeFigureOut">
               <a:rPr lang="en-US" smtClean="0"/>
-              <a:t>12/10/2024</a:t>
+              <a:t>1/8/2025</a:t>
             </a:fld>
             <a:endParaRPr lang="en-US"/>
           </a:p>
@@ -1169,7 +1168,7 @@
           <a:p>
             <a:fld id="{19F71C68-41E2-44A8-86D1-43B63FB46CF2}" type="datetimeFigureOut">
               <a:rPr lang="en-US" smtClean="0"/>
-              <a:t>12/10/2024</a:t>
+              <a:t>1/8/2025</a:t>
             </a:fld>
             <a:endParaRPr lang="en-US"/>
           </a:p>
@@ -1367,7 +1366,7 @@
           <a:p>
             <a:fld id="{19F71C68-41E2-44A8-86D1-43B63FB46CF2}" type="datetimeFigureOut">
               <a:rPr lang="en-US" smtClean="0"/>
-              <a:t>12/10/2024</a:t>
+              <a:t>1/8/2025</a:t>
             </a:fld>
             <a:endParaRPr lang="en-US"/>
           </a:p>
@@ -1642,7 +1641,7 @@
           <a:p>
             <a:fld id="{19F71C68-41E2-44A8-86D1-43B63FB46CF2}" type="datetimeFigureOut">
               <a:rPr lang="en-US" smtClean="0"/>
-              <a:t>12/10/2024</a:t>
+              <a:t>1/8/2025</a:t>
             </a:fld>
             <a:endParaRPr lang="en-US"/>
           </a:p>
@@ -1907,7 +1906,7 @@
           <a:p>
             <a:fld id="{19F71C68-41E2-44A8-86D1-43B63FB46CF2}" type="datetimeFigureOut">
               <a:rPr lang="en-US" smtClean="0"/>
-              <a:t>12/10/2024</a:t>
+              <a:t>1/8/2025</a:t>
             </a:fld>
             <a:endParaRPr lang="en-US"/>
           </a:p>
@@ -2319,7 +2318,7 @@
           <a:p>
             <a:fld id="{19F71C68-41E2-44A8-86D1-43B63FB46CF2}" type="datetimeFigureOut">
               <a:rPr lang="en-US" smtClean="0"/>
-              <a:t>12/10/2024</a:t>
+              <a:t>1/8/2025</a:t>
             </a:fld>
             <a:endParaRPr lang="en-US"/>
           </a:p>
@@ -2460,7 +2459,7 @@
           <a:p>
             <a:fld id="{19F71C68-41E2-44A8-86D1-43B63FB46CF2}" type="datetimeFigureOut">
               <a:rPr lang="en-US" smtClean="0"/>
-              <a:t>12/10/2024</a:t>
+              <a:t>1/8/2025</a:t>
             </a:fld>
             <a:endParaRPr lang="en-US"/>
           </a:p>
@@ -2573,7 +2572,7 @@
           <a:p>
             <a:fld id="{19F71C68-41E2-44A8-86D1-43B63FB46CF2}" type="datetimeFigureOut">
               <a:rPr lang="en-US" smtClean="0"/>
-              <a:t>12/10/2024</a:t>
+              <a:t>1/8/2025</a:t>
             </a:fld>
             <a:endParaRPr lang="en-US"/>
           </a:p>
@@ -2884,7 +2883,7 @@
           <a:p>
             <a:fld id="{19F71C68-41E2-44A8-86D1-43B63FB46CF2}" type="datetimeFigureOut">
               <a:rPr lang="en-US" smtClean="0"/>
-              <a:t>12/10/2024</a:t>
+              <a:t>1/8/2025</a:t>
             </a:fld>
             <a:endParaRPr lang="en-US"/>
           </a:p>
@@ -3172,7 +3171,7 @@
           <a:p>
             <a:fld id="{19F71C68-41E2-44A8-86D1-43B63FB46CF2}" type="datetimeFigureOut">
               <a:rPr lang="en-US" smtClean="0"/>
-              <a:t>12/10/2024</a:t>
+              <a:t>1/8/2025</a:t>
             </a:fld>
             <a:endParaRPr lang="en-US"/>
           </a:p>
@@ -3413,7 +3412,7 @@
           <a:p>
             <a:fld id="{19F71C68-41E2-44A8-86D1-43B63FB46CF2}" type="datetimeFigureOut">
               <a:rPr lang="en-US" smtClean="0"/>
-              <a:t>12/10/2024</a:t>
+              <a:t>1/8/2025</a:t>
             </a:fld>
             <a:endParaRPr lang="en-US"/>
           </a:p>
@@ -32588,2110 +32587,6 @@
 </p:sld>
 </file>
 
-<file path=ppt/slides/slide9.xml><?xml version="1.0" encoding="utf-8"?>
-<p:sld xmlns:a="http://schemas.openxmlformats.org/drawingml/2006/main" xmlns:r="http://schemas.openxmlformats.org/officeDocument/2006/relationships" xmlns:p="http://schemas.openxmlformats.org/presentationml/2006/main">
-  <p:cSld>
-    <p:bg>
-      <p:bgPr>
-        <a:solidFill>
-          <a:schemeClr val="accent2">
-            <a:lumMod val="40000"/>
-            <a:lumOff val="60000"/>
-          </a:schemeClr>
-        </a:solidFill>
-        <a:effectLst/>
-      </p:bgPr>
-    </p:bg>
-    <p:spTree>
-      <p:nvGrpSpPr>
-        <p:cNvPr id="1" name=""/>
-        <p:cNvGrpSpPr/>
-        <p:nvPr/>
-      </p:nvGrpSpPr>
-      <p:grpSpPr>
-        <a:xfrm>
-          <a:off x="0" y="0"/>
-          <a:ext cx="0" cy="0"/>
-          <a:chOff x="0" y="0"/>
-          <a:chExt cx="0" cy="0"/>
-        </a:xfrm>
-      </p:grpSpPr>
-      <p:sp>
-        <p:nvSpPr>
-          <p:cNvPr id="4" name="Rectangle 3">
-            <a:extLst>
-              <a:ext uri="{FF2B5EF4-FFF2-40B4-BE49-F238E27FC236}">
-                <a16:creationId xmlns:a16="http://schemas.microsoft.com/office/drawing/2014/main" id="{75752FBD-FFDA-ECA5-C8CF-C268E3BD9C21}"/>
-              </a:ext>
-            </a:extLst>
-          </p:cNvPr>
-          <p:cNvSpPr/>
-          <p:nvPr/>
-        </p:nvSpPr>
-        <p:spPr>
-          <a:xfrm>
-            <a:off x="58723" y="92279"/>
-            <a:ext cx="3807883" cy="5603846"/>
-          </a:xfrm>
-          <a:prstGeom prst="rect">
-            <a:avLst/>
-          </a:prstGeom>
-          <a:solidFill>
-            <a:schemeClr val="accent5">
-              <a:lumMod val="40000"/>
-              <a:lumOff val="60000"/>
-            </a:schemeClr>
-          </a:solidFill>
-          <a:ln>
-            <a:noFill/>
-          </a:ln>
-        </p:spPr>
-        <p:style>
-          <a:lnRef idx="2">
-            <a:schemeClr val="accent1">
-              <a:shade val="15000"/>
-            </a:schemeClr>
-          </a:lnRef>
-          <a:fillRef idx="1">
-            <a:schemeClr val="accent1"/>
-          </a:fillRef>
-          <a:effectRef idx="0">
-            <a:schemeClr val="accent1"/>
-          </a:effectRef>
-          <a:fontRef idx="minor">
-            <a:schemeClr val="lt1"/>
-          </a:fontRef>
-        </p:style>
-        <p:txBody>
-          <a:bodyPr rtlCol="0" anchor="t"/>
-          <a:lstStyle/>
-          <a:p>
-            <a:pPr marL="0" marR="0" lvl="0" indent="0" algn="l" defTabSz="914400" rtl="0" eaLnBrk="1" fontAlgn="auto" latinLnBrk="0" hangingPunct="1">
-              <a:lnSpc>
-                <a:spcPct val="100000"/>
-              </a:lnSpc>
-              <a:spcBef>
-                <a:spcPts val="0"/>
-              </a:spcBef>
-              <a:spcAft>
-                <a:spcPts val="0"/>
-              </a:spcAft>
-              <a:buClrTx/>
-              <a:buSzTx/>
-              <a:buFontTx/>
-              <a:buNone/>
-              <a:tabLst/>
-              <a:defRPr/>
-            </a:pPr>
-            <a:r>
-              <a:rPr kumimoji="0" lang="en-US" sz="1100" b="1" i="0" u="none" strike="noStrike" kern="1200" cap="none" spc="0" normalizeH="0" baseline="0" noProof="0" dirty="0">
-                <a:ln>
-                  <a:noFill/>
-                </a:ln>
-                <a:solidFill>
-                  <a:srgbClr val="FF0000"/>
-                </a:solidFill>
-                <a:effectLst/>
-                <a:uLnTx/>
-                <a:uFillTx/>
-                <a:latin typeface="Calibri" panose="020F0502020204030204"/>
-                <a:ea typeface="+mn-ea"/>
-                <a:cs typeface="+mn-cs"/>
-              </a:rPr>
-              <a:t>Add NTDP Core – Track Set Up  - Search Page</a:t>
-            </a:r>
-          </a:p>
-          <a:p>
-            <a:pPr marL="0" marR="0" lvl="0" indent="0" algn="l" defTabSz="914400" rtl="0" eaLnBrk="1" fontAlgn="auto" latinLnBrk="0" hangingPunct="1">
-              <a:lnSpc>
-                <a:spcPct val="100000"/>
-              </a:lnSpc>
-              <a:spcBef>
-                <a:spcPts val="0"/>
-              </a:spcBef>
-              <a:spcAft>
-                <a:spcPts val="0"/>
-              </a:spcAft>
-              <a:buClrTx/>
-              <a:buSzTx/>
-              <a:buFontTx/>
-              <a:buNone/>
-              <a:tabLst/>
-              <a:defRPr/>
-            </a:pPr>
-            <a:r>
-              <a:rPr kumimoji="0" lang="en-US" sz="1100" b="1" i="0" u="none" strike="noStrike" kern="1200" cap="none" spc="0" normalizeH="0" baseline="0" noProof="0" dirty="0">
-                <a:ln>
-                  <a:noFill/>
-                </a:ln>
-                <a:solidFill>
-                  <a:srgbClr val="0070C0"/>
-                </a:solidFill>
-                <a:effectLst/>
-                <a:uLnTx/>
-                <a:uFillTx/>
-                <a:latin typeface="Calibri" panose="020F0502020204030204"/>
-                <a:ea typeface="+mn-ea"/>
-                <a:cs typeface="+mn-cs"/>
-              </a:rPr>
-              <a:t>Role: NTDP Admin</a:t>
-            </a:r>
-          </a:p>
-          <a:p>
-            <a:pPr marL="0" marR="0" lvl="0" indent="0" algn="l" defTabSz="914400" rtl="0" eaLnBrk="1" fontAlgn="auto" latinLnBrk="0" hangingPunct="1">
-              <a:lnSpc>
-                <a:spcPct val="100000"/>
-              </a:lnSpc>
-              <a:spcBef>
-                <a:spcPts val="0"/>
-              </a:spcBef>
-              <a:spcAft>
-                <a:spcPts val="0"/>
-              </a:spcAft>
-              <a:buClrTx/>
-              <a:buSzTx/>
-              <a:buFontTx/>
-              <a:buNone/>
-              <a:tabLst/>
-              <a:defRPr/>
-            </a:pPr>
-            <a:r>
-              <a:rPr kumimoji="0" lang="en-US" sz="1100" b="1" i="0" u="none" strike="noStrike" kern="1200" cap="none" spc="0" normalizeH="0" baseline="0" noProof="0" dirty="0">
-                <a:ln>
-                  <a:noFill/>
-                </a:ln>
-                <a:solidFill>
-                  <a:srgbClr val="C00000"/>
-                </a:solidFill>
-                <a:effectLst/>
-                <a:uLnTx/>
-                <a:uFillTx/>
-                <a:latin typeface="Calibri" panose="020F0502020204030204"/>
-                <a:ea typeface="+mn-ea"/>
-                <a:cs typeface="+mn-cs"/>
-              </a:rPr>
-              <a:t>Part 1:  Add search filters</a:t>
-            </a:r>
-          </a:p>
-          <a:p>
-            <a:pPr marL="228600" marR="0" lvl="0" indent="-228600" algn="l" defTabSz="914400" rtl="0" eaLnBrk="1" fontAlgn="auto" latinLnBrk="0" hangingPunct="1">
-              <a:lnSpc>
-                <a:spcPct val="100000"/>
-              </a:lnSpc>
-              <a:spcBef>
-                <a:spcPts val="0"/>
-              </a:spcBef>
-              <a:spcAft>
-                <a:spcPts val="0"/>
-              </a:spcAft>
-              <a:buClrTx/>
-              <a:buSzTx/>
-              <a:buFont typeface="+mj-lt"/>
-              <a:buAutoNum type="arabicPeriod"/>
-              <a:tabLst/>
-              <a:defRPr/>
-            </a:pPr>
-            <a:r>
-              <a:rPr kumimoji="0" lang="en-US" sz="1100" b="0" i="0" u="none" strike="noStrike" kern="1200" cap="none" spc="0" normalizeH="0" baseline="0" noProof="0" dirty="0">
-                <a:ln>
-                  <a:noFill/>
-                </a:ln>
-                <a:solidFill>
-                  <a:sysClr val="windowText" lastClr="000000"/>
-                </a:solidFill>
-                <a:effectLst/>
-                <a:uLnTx/>
-                <a:uFillTx/>
-                <a:latin typeface="Calibri" panose="020F0502020204030204"/>
-                <a:ea typeface="+mn-ea"/>
-                <a:cs typeface="+mn-cs"/>
-              </a:rPr>
-              <a:t>Add page header =</a:t>
-            </a:r>
-          </a:p>
-          <a:p>
-            <a:pPr marL="685800" marR="0" lvl="1" indent="-228600" algn="l" defTabSz="914400" rtl="0" eaLnBrk="1" fontAlgn="auto" latinLnBrk="0" hangingPunct="1">
-              <a:lnSpc>
-                <a:spcPct val="100000"/>
-              </a:lnSpc>
-              <a:spcBef>
-                <a:spcPts val="0"/>
-              </a:spcBef>
-              <a:spcAft>
-                <a:spcPts val="0"/>
-              </a:spcAft>
-              <a:buClrTx/>
-              <a:buSzTx/>
-              <a:buFont typeface="+mj-lt"/>
-              <a:buAutoNum type="arabicPeriod"/>
-              <a:tabLst/>
-              <a:defRPr/>
-            </a:pPr>
-            <a:r>
-              <a:rPr kumimoji="0" lang="en-US" sz="1100" b="0" i="0" u="none" strike="noStrike" kern="1200" cap="none" spc="0" normalizeH="0" baseline="0" noProof="0" dirty="0">
-                <a:ln>
-                  <a:noFill/>
-                </a:ln>
-                <a:solidFill>
-                  <a:sysClr val="windowText" lastClr="000000"/>
-                </a:solidFill>
-                <a:effectLst/>
-                <a:uLnTx/>
-                <a:uFillTx/>
-                <a:latin typeface="Calibri" panose="020F0502020204030204"/>
-                <a:ea typeface="+mn-ea"/>
-                <a:cs typeface="+mn-cs"/>
-              </a:rPr>
-              <a:t>Label = NTDP Core – </a:t>
-            </a:r>
-            <a:r>
-              <a:rPr lang="en-US" sz="1100" dirty="0">
-                <a:solidFill>
-                  <a:sysClr val="windowText" lastClr="000000"/>
-                </a:solidFill>
-                <a:latin typeface="Calibri" panose="020F0502020204030204"/>
-              </a:rPr>
-              <a:t>Track Set Up</a:t>
-            </a:r>
-            <a:endParaRPr kumimoji="0" lang="en-US" sz="1100" b="0" i="0" u="none" strike="noStrike" kern="1200" cap="none" spc="0" normalizeH="0" baseline="0" noProof="0" dirty="0">
-              <a:ln>
-                <a:noFill/>
-              </a:ln>
-              <a:solidFill>
-                <a:sysClr val="windowText" lastClr="000000"/>
-              </a:solidFill>
-              <a:effectLst/>
-              <a:uLnTx/>
-              <a:uFillTx/>
-              <a:latin typeface="Calibri" panose="020F0502020204030204"/>
-              <a:ea typeface="+mn-ea"/>
-              <a:cs typeface="+mn-cs"/>
-            </a:endParaRPr>
-          </a:p>
-          <a:p>
-            <a:pPr marL="685800" marR="0" lvl="1" indent="-228600" algn="l" defTabSz="914400" rtl="0" eaLnBrk="1" fontAlgn="auto" latinLnBrk="0" hangingPunct="1">
-              <a:lnSpc>
-                <a:spcPct val="100000"/>
-              </a:lnSpc>
-              <a:spcBef>
-                <a:spcPts val="0"/>
-              </a:spcBef>
-              <a:spcAft>
-                <a:spcPts val="0"/>
-              </a:spcAft>
-              <a:buClrTx/>
-              <a:buSzTx/>
-              <a:buFont typeface="+mj-lt"/>
-              <a:buAutoNum type="arabicPeriod"/>
-              <a:tabLst/>
-              <a:defRPr/>
-            </a:pPr>
-            <a:r>
-              <a:rPr kumimoji="0" lang="en-US" sz="1100" b="0" i="0" u="none" strike="noStrike" kern="1200" cap="none" spc="0" normalizeH="0" baseline="0" noProof="0" dirty="0">
-                <a:ln>
-                  <a:noFill/>
-                </a:ln>
-                <a:solidFill>
-                  <a:sysClr val="windowText" lastClr="000000"/>
-                </a:solidFill>
-                <a:effectLst/>
-                <a:uLnTx/>
-                <a:uFillTx/>
-                <a:latin typeface="Calibri" panose="020F0502020204030204"/>
-                <a:ea typeface="+mn-ea"/>
-                <a:cs typeface="+mn-cs"/>
-              </a:rPr>
-              <a:t>Dark green with white font, bold</a:t>
-            </a:r>
-          </a:p>
-          <a:p>
-            <a:pPr marL="228600" marR="0" lvl="0" indent="-228600" algn="l" defTabSz="914400" rtl="0" eaLnBrk="1" fontAlgn="auto" latinLnBrk="0" hangingPunct="1">
-              <a:lnSpc>
-                <a:spcPct val="100000"/>
-              </a:lnSpc>
-              <a:spcBef>
-                <a:spcPts val="0"/>
-              </a:spcBef>
-              <a:spcAft>
-                <a:spcPts val="0"/>
-              </a:spcAft>
-              <a:buClrTx/>
-              <a:buSzTx/>
-              <a:buFont typeface="+mj-lt"/>
-              <a:buAutoNum type="arabicPeriod"/>
-              <a:tabLst/>
-              <a:defRPr/>
-            </a:pPr>
-            <a:r>
-              <a:rPr kumimoji="0" lang="en-US" sz="1100" b="0" i="0" u="none" strike="noStrike" kern="1200" cap="none" spc="0" normalizeH="0" baseline="0" noProof="0" dirty="0">
-                <a:ln>
-                  <a:noFill/>
-                </a:ln>
-                <a:solidFill>
-                  <a:sysClr val="windowText" lastClr="000000"/>
-                </a:solidFill>
-                <a:effectLst/>
-                <a:uLnTx/>
-                <a:uFillTx/>
-                <a:latin typeface="Calibri" panose="020F0502020204030204"/>
-                <a:ea typeface="+mn-ea"/>
-                <a:cs typeface="+mn-cs"/>
-              </a:rPr>
-              <a:t>Add filter = NTDP Core Track</a:t>
-            </a:r>
-          </a:p>
-          <a:p>
-            <a:pPr marL="685800" marR="0" lvl="1" indent="-228600" algn="l" defTabSz="914400" rtl="0" eaLnBrk="1" fontAlgn="auto" latinLnBrk="0" hangingPunct="1">
-              <a:lnSpc>
-                <a:spcPct val="100000"/>
-              </a:lnSpc>
-              <a:spcBef>
-                <a:spcPts val="0"/>
-              </a:spcBef>
-              <a:spcAft>
-                <a:spcPts val="0"/>
-              </a:spcAft>
-              <a:buClrTx/>
-              <a:buSzTx/>
-              <a:buFont typeface="+mj-lt"/>
-              <a:buAutoNum type="arabicPeriod"/>
-              <a:tabLst/>
-              <a:defRPr/>
-            </a:pPr>
-            <a:r>
-              <a:rPr kumimoji="0" lang="en-US" sz="1100" b="0" i="0" u="none" strike="noStrike" kern="1200" cap="none" spc="0" normalizeH="0" baseline="0" noProof="0" dirty="0">
-                <a:ln>
-                  <a:noFill/>
-                </a:ln>
-                <a:solidFill>
-                  <a:sysClr val="windowText" lastClr="000000"/>
-                </a:solidFill>
-                <a:effectLst/>
-                <a:uLnTx/>
-                <a:uFillTx/>
-                <a:latin typeface="Calibri" panose="020F0502020204030204"/>
-                <a:ea typeface="+mn-ea"/>
-                <a:cs typeface="+mn-cs"/>
-              </a:rPr>
-              <a:t>Dropdown </a:t>
-            </a:r>
-          </a:p>
-          <a:p>
-            <a:pPr marL="1143000" marR="0" lvl="2" indent="-228600" algn="l" defTabSz="914400" rtl="0" eaLnBrk="1" fontAlgn="auto" latinLnBrk="0" hangingPunct="1">
-              <a:lnSpc>
-                <a:spcPct val="100000"/>
-              </a:lnSpc>
-              <a:spcBef>
-                <a:spcPts val="0"/>
-              </a:spcBef>
-              <a:spcAft>
-                <a:spcPts val="0"/>
-              </a:spcAft>
-              <a:buClrTx/>
-              <a:buSzTx/>
-              <a:buFont typeface="+mj-lt"/>
-              <a:buAutoNum type="arabicPeriod"/>
-              <a:tabLst/>
-              <a:defRPr/>
-            </a:pPr>
-            <a:r>
-              <a:rPr kumimoji="0" lang="en-US" sz="1100" b="0" i="0" u="none" strike="noStrike" kern="1200" cap="none" spc="0" normalizeH="0" baseline="0" noProof="0" dirty="0">
-                <a:ln>
-                  <a:noFill/>
-                </a:ln>
-                <a:solidFill>
-                  <a:sysClr val="windowText" lastClr="000000"/>
-                </a:solidFill>
-                <a:effectLst/>
-                <a:uLnTx/>
-                <a:uFillTx/>
-                <a:latin typeface="Calibri" panose="020F0502020204030204"/>
-                <a:ea typeface="+mn-ea"/>
-                <a:cs typeface="+mn-cs"/>
-              </a:rPr>
-              <a:t>Select (displays all tracks) default</a:t>
-            </a:r>
-          </a:p>
-          <a:p>
-            <a:pPr marL="1143000" marR="0" lvl="2" indent="-228600" algn="l" defTabSz="914400" rtl="0" eaLnBrk="1" fontAlgn="auto" latinLnBrk="0" hangingPunct="1">
-              <a:lnSpc>
-                <a:spcPct val="100000"/>
-              </a:lnSpc>
-              <a:spcBef>
-                <a:spcPts val="0"/>
-              </a:spcBef>
-              <a:spcAft>
-                <a:spcPts val="0"/>
-              </a:spcAft>
-              <a:buClrTx/>
-              <a:buSzTx/>
-              <a:buFont typeface="+mj-lt"/>
-              <a:buAutoNum type="arabicPeriod"/>
-              <a:tabLst/>
-              <a:defRPr/>
-            </a:pPr>
-            <a:r>
-              <a:rPr kumimoji="0" lang="en-US" sz="1100" b="0" i="0" u="none" strike="noStrike" kern="1200" cap="none" spc="0" normalizeH="0" baseline="0" noProof="0" dirty="0">
-                <a:ln>
-                  <a:noFill/>
-                </a:ln>
-                <a:solidFill>
-                  <a:sysClr val="windowText" lastClr="000000"/>
-                </a:solidFill>
-                <a:effectLst/>
-                <a:uLnTx/>
-                <a:uFillTx/>
-                <a:latin typeface="Calibri" panose="020F0502020204030204"/>
-                <a:ea typeface="+mn-ea"/>
-                <a:cs typeface="+mn-cs"/>
-              </a:rPr>
-              <a:t>List individual tracks</a:t>
-            </a:r>
-          </a:p>
-          <a:p>
-            <a:pPr marL="228600" marR="0" lvl="0" indent="-228600" algn="l" defTabSz="914400" rtl="0" eaLnBrk="1" fontAlgn="auto" latinLnBrk="0" hangingPunct="1">
-              <a:lnSpc>
-                <a:spcPct val="100000"/>
-              </a:lnSpc>
-              <a:spcBef>
-                <a:spcPts val="0"/>
-              </a:spcBef>
-              <a:spcAft>
-                <a:spcPts val="0"/>
-              </a:spcAft>
-              <a:buClrTx/>
-              <a:buSzTx/>
-              <a:buFont typeface="+mj-lt"/>
-              <a:buAutoNum type="arabicPeriod"/>
-              <a:tabLst/>
-              <a:defRPr/>
-            </a:pPr>
-            <a:r>
-              <a:rPr kumimoji="0" lang="en-US" sz="1100" b="0" i="0" u="none" strike="noStrike" kern="1200" cap="none" spc="0" normalizeH="0" baseline="0" noProof="0" dirty="0">
-                <a:ln>
-                  <a:noFill/>
-                </a:ln>
-                <a:solidFill>
-                  <a:sysClr val="windowText" lastClr="000000"/>
-                </a:solidFill>
-                <a:effectLst/>
-                <a:uLnTx/>
-                <a:uFillTx/>
-                <a:latin typeface="Calibri" panose="020F0502020204030204"/>
-                <a:ea typeface="+mn-ea"/>
-                <a:cs typeface="+mn-cs"/>
-              </a:rPr>
-              <a:t>Add button = Search</a:t>
-            </a:r>
-          </a:p>
-          <a:p>
-            <a:pPr marL="228600" marR="0" lvl="0" indent="-228600" algn="l" defTabSz="914400" rtl="0" eaLnBrk="1" fontAlgn="auto" latinLnBrk="0" hangingPunct="1">
-              <a:lnSpc>
-                <a:spcPct val="100000"/>
-              </a:lnSpc>
-              <a:spcBef>
-                <a:spcPts val="0"/>
-              </a:spcBef>
-              <a:spcAft>
-                <a:spcPts val="0"/>
-              </a:spcAft>
-              <a:buClrTx/>
-              <a:buSzTx/>
-              <a:buFont typeface="+mj-lt"/>
-              <a:buAutoNum type="arabicPeriod"/>
-              <a:tabLst/>
-              <a:defRPr/>
-            </a:pPr>
-            <a:r>
-              <a:rPr kumimoji="0" lang="en-US" sz="1100" b="0" i="0" u="none" strike="noStrike" kern="1200" cap="none" spc="0" normalizeH="0" baseline="0" noProof="0" dirty="0">
-                <a:ln>
-                  <a:noFill/>
-                </a:ln>
-                <a:solidFill>
-                  <a:sysClr val="windowText" lastClr="000000"/>
-                </a:solidFill>
-                <a:effectLst/>
-                <a:uLnTx/>
-                <a:uFillTx/>
-                <a:latin typeface="Calibri" panose="020F0502020204030204"/>
-                <a:ea typeface="+mn-ea"/>
-                <a:cs typeface="+mn-cs"/>
-              </a:rPr>
-              <a:t>Add Button = Clear</a:t>
-            </a:r>
-          </a:p>
-          <a:p>
-            <a:pPr marL="0" marR="0" lvl="0" indent="0" algn="l" defTabSz="914400" rtl="0" eaLnBrk="1" fontAlgn="auto" latinLnBrk="0" hangingPunct="1">
-              <a:lnSpc>
-                <a:spcPct val="100000"/>
-              </a:lnSpc>
-              <a:spcBef>
-                <a:spcPts val="0"/>
-              </a:spcBef>
-              <a:spcAft>
-                <a:spcPts val="0"/>
-              </a:spcAft>
-              <a:buClrTx/>
-              <a:buSzTx/>
-              <a:buFontTx/>
-              <a:buNone/>
-              <a:tabLst/>
-              <a:defRPr/>
-            </a:pPr>
-            <a:endParaRPr kumimoji="0" lang="en-US" sz="1100" b="1" i="0" u="none" strike="noStrike" kern="1200" cap="none" spc="0" normalizeH="0" baseline="0" noProof="0" dirty="0">
-              <a:ln>
-                <a:noFill/>
-              </a:ln>
-              <a:solidFill>
-                <a:srgbClr val="C00000"/>
-              </a:solidFill>
-              <a:effectLst/>
-              <a:uLnTx/>
-              <a:uFillTx/>
-              <a:latin typeface="Calibri" panose="020F0502020204030204"/>
-              <a:ea typeface="+mn-ea"/>
-              <a:cs typeface="+mn-cs"/>
-            </a:endParaRPr>
-          </a:p>
-          <a:p>
-            <a:pPr marL="0" marR="0" lvl="0" indent="0" algn="l" defTabSz="914400" rtl="0" eaLnBrk="1" fontAlgn="auto" latinLnBrk="0" hangingPunct="1">
-              <a:lnSpc>
-                <a:spcPct val="100000"/>
-              </a:lnSpc>
-              <a:spcBef>
-                <a:spcPts val="0"/>
-              </a:spcBef>
-              <a:spcAft>
-                <a:spcPts val="0"/>
-              </a:spcAft>
-              <a:buClrTx/>
-              <a:buSzTx/>
-              <a:buFontTx/>
-              <a:buNone/>
-              <a:tabLst/>
-              <a:defRPr/>
-            </a:pPr>
-            <a:r>
-              <a:rPr kumimoji="0" lang="en-US" sz="1100" b="1" i="0" u="none" strike="noStrike" kern="1200" cap="none" spc="0" normalizeH="0" baseline="0" noProof="0" dirty="0">
-                <a:ln>
-                  <a:noFill/>
-                </a:ln>
-                <a:solidFill>
-                  <a:srgbClr val="C00000"/>
-                </a:solidFill>
-                <a:effectLst/>
-                <a:uLnTx/>
-                <a:uFillTx/>
-                <a:latin typeface="Calibri" panose="020F0502020204030204"/>
-                <a:ea typeface="+mn-ea"/>
-                <a:cs typeface="+mn-cs"/>
-              </a:rPr>
-              <a:t>Part 2:  Add display grid</a:t>
-            </a:r>
-          </a:p>
-          <a:p>
-            <a:pPr marL="228600" marR="0" lvl="0" indent="-228600" algn="l" defTabSz="914400" rtl="0" eaLnBrk="1" fontAlgn="auto" latinLnBrk="0" hangingPunct="1">
-              <a:lnSpc>
-                <a:spcPct val="100000"/>
-              </a:lnSpc>
-              <a:spcBef>
-                <a:spcPts val="0"/>
-              </a:spcBef>
-              <a:spcAft>
-                <a:spcPts val="0"/>
-              </a:spcAft>
-              <a:buClrTx/>
-              <a:buSzTx/>
-              <a:buFont typeface="+mj-lt"/>
-              <a:buAutoNum type="arabicPeriod"/>
-              <a:tabLst/>
-              <a:defRPr/>
-            </a:pPr>
-            <a:r>
-              <a:rPr kumimoji="0" lang="en-US" sz="1100" b="0" i="0" u="none" strike="noStrike" kern="1200" cap="none" spc="0" normalizeH="0" baseline="0" noProof="0" dirty="0">
-                <a:ln>
-                  <a:noFill/>
-                </a:ln>
-                <a:solidFill>
-                  <a:sysClr val="windowText" lastClr="000000"/>
-                </a:solidFill>
-                <a:effectLst/>
-                <a:uLnTx/>
-                <a:uFillTx/>
-                <a:latin typeface="Calibri" panose="020F0502020204030204"/>
-                <a:ea typeface="+mn-ea"/>
-                <a:cs typeface="+mn-cs"/>
-              </a:rPr>
-              <a:t>Add Button = Create New NTDP Core Track</a:t>
-            </a:r>
-          </a:p>
-          <a:p>
-            <a:pPr marL="685800" marR="0" lvl="1" indent="-228600" algn="l" defTabSz="914400" rtl="0" eaLnBrk="1" fontAlgn="auto" latinLnBrk="0" hangingPunct="1">
-              <a:lnSpc>
-                <a:spcPct val="100000"/>
-              </a:lnSpc>
-              <a:spcBef>
-                <a:spcPts val="0"/>
-              </a:spcBef>
-              <a:spcAft>
-                <a:spcPts val="0"/>
-              </a:spcAft>
-              <a:buClrTx/>
-              <a:buSzTx/>
-              <a:buFont typeface="+mj-lt"/>
-              <a:buAutoNum type="arabicPeriod"/>
-              <a:tabLst/>
-              <a:defRPr/>
-            </a:pPr>
-            <a:r>
-              <a:rPr lang="en-US" sz="1100" dirty="0">
-                <a:solidFill>
-                  <a:sysClr val="windowText" lastClr="000000"/>
-                </a:solidFill>
-                <a:latin typeface="Calibri" panose="020F0502020204030204"/>
-              </a:rPr>
-              <a:t>Gold background, blank font = </a:t>
-            </a:r>
-            <a:r>
-              <a:rPr kumimoji="0" lang="en-US" sz="1100" b="0" i="0" u="none" strike="noStrike" kern="1200" cap="none" spc="0" normalizeH="0" baseline="0" noProof="0" dirty="0">
-                <a:ln>
-                  <a:noFill/>
-                </a:ln>
-                <a:solidFill>
-                  <a:sysClr val="windowText" lastClr="000000"/>
-                </a:solidFill>
-                <a:effectLst/>
-                <a:uLnTx/>
-                <a:uFillTx/>
-                <a:latin typeface="Calibri" panose="020F0502020204030204"/>
-                <a:ea typeface="+mn-ea"/>
-                <a:cs typeface="+mn-cs"/>
-              </a:rPr>
-              <a:t>This opens the Class Scheduler data entry form</a:t>
-            </a:r>
-          </a:p>
-          <a:p>
-            <a:pPr marL="228600" marR="0" lvl="0" indent="-228600" algn="l" defTabSz="914400" rtl="0" eaLnBrk="1" fontAlgn="auto" latinLnBrk="0" hangingPunct="1">
-              <a:lnSpc>
-                <a:spcPct val="100000"/>
-              </a:lnSpc>
-              <a:spcBef>
-                <a:spcPts val="0"/>
-              </a:spcBef>
-              <a:spcAft>
-                <a:spcPts val="0"/>
-              </a:spcAft>
-              <a:buClrTx/>
-              <a:buSzTx/>
-              <a:buFont typeface="+mj-lt"/>
-              <a:buAutoNum type="arabicPeriod"/>
-              <a:tabLst/>
-              <a:defRPr/>
-            </a:pPr>
-            <a:r>
-              <a:rPr kumimoji="0" lang="en-US" sz="1100" b="0" i="0" u="none" strike="noStrike" kern="1200" cap="none" spc="0" normalizeH="0" baseline="0" noProof="0" dirty="0">
-                <a:ln>
-                  <a:noFill/>
-                </a:ln>
-                <a:solidFill>
-                  <a:sysClr val="windowText" lastClr="000000"/>
-                </a:solidFill>
-                <a:effectLst/>
-                <a:uLnTx/>
-                <a:uFillTx/>
-                <a:latin typeface="Calibri" panose="020F0502020204030204"/>
-                <a:ea typeface="+mn-ea"/>
-                <a:cs typeface="+mn-cs"/>
-              </a:rPr>
-              <a:t>Add Results Grid</a:t>
-            </a:r>
-          </a:p>
-          <a:p>
-            <a:pPr marL="685800" marR="0" lvl="1" indent="-228600" algn="l" defTabSz="914400" rtl="0" eaLnBrk="1" fontAlgn="auto" latinLnBrk="0" hangingPunct="1">
-              <a:lnSpc>
-                <a:spcPct val="100000"/>
-              </a:lnSpc>
-              <a:spcBef>
-                <a:spcPts val="0"/>
-              </a:spcBef>
-              <a:spcAft>
-                <a:spcPts val="0"/>
-              </a:spcAft>
-              <a:buClrTx/>
-              <a:buSzTx/>
-              <a:buFont typeface="+mj-lt"/>
-              <a:buAutoNum type="arabicPeriod"/>
-              <a:tabLst/>
-              <a:defRPr/>
-            </a:pPr>
-            <a:r>
-              <a:rPr kumimoji="0" lang="en-US" sz="1100" b="0" i="0" u="none" strike="noStrike" kern="1200" cap="none" spc="0" normalizeH="0" baseline="0" noProof="0" dirty="0">
-                <a:ln>
-                  <a:noFill/>
-                </a:ln>
-                <a:solidFill>
-                  <a:sysClr val="windowText" lastClr="000000"/>
-                </a:solidFill>
-                <a:effectLst/>
-                <a:uLnTx/>
-                <a:uFillTx/>
-                <a:latin typeface="Calibri" panose="020F0502020204030204"/>
-                <a:ea typeface="+mn-ea"/>
-                <a:cs typeface="+mn-cs"/>
-              </a:rPr>
-              <a:t>Add column = Track ID</a:t>
-            </a:r>
-          </a:p>
-          <a:p>
-            <a:pPr marL="685800" marR="0" lvl="1" indent="-228600" algn="l" defTabSz="914400" rtl="0" eaLnBrk="1" fontAlgn="auto" latinLnBrk="0" hangingPunct="1">
-              <a:lnSpc>
-                <a:spcPct val="100000"/>
-              </a:lnSpc>
-              <a:spcBef>
-                <a:spcPts val="0"/>
-              </a:spcBef>
-              <a:spcAft>
-                <a:spcPts val="0"/>
-              </a:spcAft>
-              <a:buClrTx/>
-              <a:buSzTx/>
-              <a:buFont typeface="+mj-lt"/>
-              <a:buAutoNum type="arabicPeriod"/>
-              <a:tabLst/>
-              <a:defRPr/>
-            </a:pPr>
-            <a:r>
-              <a:rPr kumimoji="0" lang="en-US" sz="1100" b="0" i="0" u="none" strike="noStrike" kern="1200" cap="none" spc="0" normalizeH="0" baseline="0" noProof="0" dirty="0">
-                <a:ln>
-                  <a:noFill/>
-                </a:ln>
-                <a:solidFill>
-                  <a:sysClr val="windowText" lastClr="000000"/>
-                </a:solidFill>
-                <a:effectLst/>
-                <a:uLnTx/>
-                <a:uFillTx/>
-                <a:latin typeface="Calibri" panose="020F0502020204030204"/>
-                <a:ea typeface="+mn-ea"/>
-                <a:cs typeface="+mn-cs"/>
-              </a:rPr>
-              <a:t>Add column = Track Name</a:t>
-            </a:r>
-          </a:p>
-          <a:p>
-            <a:pPr marL="685800" marR="0" lvl="1" indent="-228600" algn="l" defTabSz="914400" rtl="0" eaLnBrk="1" fontAlgn="auto" latinLnBrk="0" hangingPunct="1">
-              <a:lnSpc>
-                <a:spcPct val="100000"/>
-              </a:lnSpc>
-              <a:spcBef>
-                <a:spcPts val="0"/>
-              </a:spcBef>
-              <a:spcAft>
-                <a:spcPts val="0"/>
-              </a:spcAft>
-              <a:buClrTx/>
-              <a:buSzTx/>
-              <a:buFont typeface="+mj-lt"/>
-              <a:buAutoNum type="arabicPeriod"/>
-              <a:tabLst/>
-              <a:defRPr/>
-            </a:pPr>
-            <a:r>
-              <a:rPr kumimoji="0" lang="en-US" sz="1100" b="0" i="0" u="none" strike="noStrike" kern="1200" cap="none" spc="0" normalizeH="0" baseline="0" noProof="0" dirty="0">
-                <a:ln>
-                  <a:noFill/>
-                </a:ln>
-                <a:solidFill>
-                  <a:sysClr val="windowText" lastClr="000000"/>
-                </a:solidFill>
-                <a:effectLst/>
-                <a:uLnTx/>
-                <a:uFillTx/>
-                <a:latin typeface="Calibri" panose="020F0502020204030204"/>
-                <a:ea typeface="+mn-ea"/>
-                <a:cs typeface="+mn-cs"/>
-              </a:rPr>
-              <a:t>Add column = Track  Status</a:t>
-            </a:r>
-          </a:p>
-          <a:p>
-            <a:pPr marL="685800" marR="0" lvl="1" indent="-228600" algn="l" defTabSz="914400" rtl="0" eaLnBrk="1" fontAlgn="auto" latinLnBrk="0" hangingPunct="1">
-              <a:lnSpc>
-                <a:spcPct val="100000"/>
-              </a:lnSpc>
-              <a:spcBef>
-                <a:spcPts val="0"/>
-              </a:spcBef>
-              <a:spcAft>
-                <a:spcPts val="0"/>
-              </a:spcAft>
-              <a:buClrTx/>
-              <a:buSzTx/>
-              <a:buFont typeface="+mj-lt"/>
-              <a:buAutoNum type="arabicPeriod"/>
-              <a:tabLst/>
-              <a:defRPr/>
-            </a:pPr>
-            <a:r>
-              <a:rPr kumimoji="0" lang="en-US" sz="1100" b="0" i="0" u="none" strike="noStrike" kern="1200" cap="none" spc="0" normalizeH="0" baseline="0" noProof="0" dirty="0">
-                <a:ln>
-                  <a:noFill/>
-                </a:ln>
-                <a:solidFill>
-                  <a:sysClr val="windowText" lastClr="000000"/>
-                </a:solidFill>
-                <a:effectLst/>
-                <a:uLnTx/>
-                <a:uFillTx/>
-                <a:latin typeface="Calibri" panose="020F0502020204030204"/>
-                <a:ea typeface="+mn-ea"/>
-                <a:cs typeface="+mn-cs"/>
-              </a:rPr>
-              <a:t>Add button = Edit </a:t>
-            </a:r>
-            <a:r>
-              <a:rPr lang="en-US" sz="1100" dirty="0">
-                <a:solidFill>
-                  <a:sysClr val="windowText" lastClr="000000"/>
-                </a:solidFill>
-                <a:latin typeface="Calibri" panose="020F0502020204030204"/>
-              </a:rPr>
-              <a:t>Track</a:t>
-            </a:r>
-            <a:endParaRPr kumimoji="0" lang="en-US" sz="1100" b="0" i="0" u="none" strike="noStrike" kern="1200" cap="none" spc="0" normalizeH="0" baseline="0" noProof="0" dirty="0">
-              <a:ln>
-                <a:noFill/>
-              </a:ln>
-              <a:solidFill>
-                <a:sysClr val="windowText" lastClr="000000"/>
-              </a:solidFill>
-              <a:effectLst/>
-              <a:uLnTx/>
-              <a:uFillTx/>
-              <a:latin typeface="Calibri" panose="020F0502020204030204"/>
-              <a:ea typeface="+mn-ea"/>
-              <a:cs typeface="+mn-cs"/>
-            </a:endParaRPr>
-          </a:p>
-          <a:p>
-            <a:pPr marL="1143000" marR="0" lvl="2" indent="-228600" algn="l" defTabSz="914400" rtl="0" eaLnBrk="1" fontAlgn="auto" latinLnBrk="0" hangingPunct="1">
-              <a:lnSpc>
-                <a:spcPct val="100000"/>
-              </a:lnSpc>
-              <a:spcBef>
-                <a:spcPts val="0"/>
-              </a:spcBef>
-              <a:spcAft>
-                <a:spcPts val="0"/>
-              </a:spcAft>
-              <a:buClrTx/>
-              <a:buSzTx/>
-              <a:buFont typeface="+mj-lt"/>
-              <a:buAutoNum type="arabicPeriod"/>
-              <a:tabLst/>
-              <a:defRPr/>
-            </a:pPr>
-            <a:r>
-              <a:rPr kumimoji="0" lang="en-US" sz="1100" b="0" i="0" u="none" strike="noStrike" kern="1200" cap="none" spc="0" normalizeH="0" baseline="0" noProof="0" dirty="0">
-                <a:ln>
-                  <a:noFill/>
-                </a:ln>
-                <a:solidFill>
-                  <a:sysClr val="windowText" lastClr="000000"/>
-                </a:solidFill>
-                <a:effectLst/>
-                <a:uLnTx/>
-                <a:uFillTx/>
-                <a:latin typeface="Calibri" panose="020F0502020204030204"/>
-                <a:ea typeface="+mn-ea"/>
-                <a:cs typeface="+mn-cs"/>
-              </a:rPr>
-              <a:t>Opens specific Track Set Up Form </a:t>
-            </a:r>
-          </a:p>
-          <a:p>
-            <a:pPr marL="685800" marR="0" lvl="1" indent="-228600" algn="l" defTabSz="914400" rtl="0" eaLnBrk="1" fontAlgn="auto" latinLnBrk="0" hangingPunct="1">
-              <a:lnSpc>
-                <a:spcPct val="100000"/>
-              </a:lnSpc>
-              <a:spcBef>
-                <a:spcPts val="0"/>
-              </a:spcBef>
-              <a:spcAft>
-                <a:spcPts val="0"/>
-              </a:spcAft>
-              <a:buClrTx/>
-              <a:buSzTx/>
-              <a:buFont typeface="+mj-lt"/>
-              <a:buAutoNum type="arabicPeriod"/>
-              <a:tabLst/>
-              <a:defRPr/>
-            </a:pPr>
-            <a:endParaRPr kumimoji="0" lang="en-US" sz="1100" b="0" i="0" u="none" strike="noStrike" kern="1200" cap="none" spc="0" normalizeH="0" baseline="0" noProof="0" dirty="0">
-              <a:ln>
-                <a:noFill/>
-              </a:ln>
-              <a:solidFill>
-                <a:sysClr val="windowText" lastClr="000000"/>
-              </a:solidFill>
-              <a:effectLst/>
-              <a:uLnTx/>
-              <a:uFillTx/>
-              <a:latin typeface="Calibri" panose="020F0502020204030204"/>
-              <a:ea typeface="+mn-ea"/>
-              <a:cs typeface="+mn-cs"/>
-            </a:endParaRPr>
-          </a:p>
-        </p:txBody>
-      </p:sp>
-      <p:pic>
-        <p:nvPicPr>
-          <p:cNvPr id="7" name="Picture 6">
-            <a:extLst>
-              <a:ext uri="{FF2B5EF4-FFF2-40B4-BE49-F238E27FC236}">
-                <a16:creationId xmlns:a16="http://schemas.microsoft.com/office/drawing/2014/main" id="{6929F66A-2434-439D-0CEA-83AA31893D25}"/>
-              </a:ext>
-            </a:extLst>
-          </p:cNvPr>
-          <p:cNvPicPr>
-            <a:picLocks noChangeAspect="1"/>
-          </p:cNvPicPr>
-          <p:nvPr/>
-        </p:nvPicPr>
-        <p:blipFill>
-          <a:blip r:embed="rId2"/>
-          <a:stretch>
-            <a:fillRect/>
-          </a:stretch>
-        </p:blipFill>
-        <p:spPr>
-          <a:xfrm>
-            <a:off x="4322824" y="1782056"/>
-            <a:ext cx="7460394" cy="2830451"/>
-          </a:xfrm>
-          <a:prstGeom prst="rect">
-            <a:avLst/>
-          </a:prstGeom>
-        </p:spPr>
-      </p:pic>
-      <p:sp>
-        <p:nvSpPr>
-          <p:cNvPr id="8" name="Rectangle 7">
-            <a:extLst>
-              <a:ext uri="{FF2B5EF4-FFF2-40B4-BE49-F238E27FC236}">
-                <a16:creationId xmlns:a16="http://schemas.microsoft.com/office/drawing/2014/main" id="{DB5AB606-EBA5-921C-B789-FF7DC92FD478}"/>
-              </a:ext>
-            </a:extLst>
-          </p:cNvPr>
-          <p:cNvSpPr/>
-          <p:nvPr/>
-        </p:nvSpPr>
-        <p:spPr>
-          <a:xfrm>
-            <a:off x="4415246" y="2078314"/>
-            <a:ext cx="1924594" cy="165463"/>
-          </a:xfrm>
-          <a:prstGeom prst="rect">
-            <a:avLst/>
-          </a:prstGeom>
-          <a:solidFill>
-            <a:srgbClr val="00CDAA"/>
-          </a:solidFill>
-          <a:ln>
-            <a:noFill/>
-          </a:ln>
-        </p:spPr>
-        <p:style>
-          <a:lnRef idx="2">
-            <a:schemeClr val="accent1">
-              <a:shade val="15000"/>
-            </a:schemeClr>
-          </a:lnRef>
-          <a:fillRef idx="1">
-            <a:schemeClr val="accent1"/>
-          </a:fillRef>
-          <a:effectRef idx="0">
-            <a:schemeClr val="accent1"/>
-          </a:effectRef>
-          <a:fontRef idx="minor">
-            <a:schemeClr val="lt1"/>
-          </a:fontRef>
-        </p:style>
-        <p:txBody>
-          <a:bodyPr rtlCol="0" anchor="ctr"/>
-          <a:lstStyle/>
-          <a:p>
-            <a:pPr marL="0" marR="0" lvl="0" indent="0" algn="l" defTabSz="914400" rtl="0" eaLnBrk="1" fontAlgn="auto" latinLnBrk="0" hangingPunct="1">
-              <a:lnSpc>
-                <a:spcPct val="100000"/>
-              </a:lnSpc>
-              <a:spcBef>
-                <a:spcPts val="0"/>
-              </a:spcBef>
-              <a:spcAft>
-                <a:spcPts val="0"/>
-              </a:spcAft>
-              <a:buClrTx/>
-              <a:buSzTx/>
-              <a:buFontTx/>
-              <a:buNone/>
-              <a:tabLst/>
-              <a:defRPr/>
-            </a:pPr>
-            <a:r>
-              <a:rPr kumimoji="0" lang="en-US" sz="1200" b="1" i="0" u="none" strike="noStrike" kern="1200" cap="none" spc="0" normalizeH="0" baseline="0" noProof="0" dirty="0">
-                <a:ln>
-                  <a:noFill/>
-                </a:ln>
-                <a:solidFill>
-                  <a:prstClr val="white"/>
-                </a:solidFill>
-                <a:effectLst/>
-                <a:uLnTx/>
-                <a:uFillTx/>
-                <a:latin typeface="Calibri" panose="020F0502020204030204"/>
-                <a:ea typeface="+mn-ea"/>
-                <a:cs typeface="+mn-cs"/>
-              </a:rPr>
-              <a:t>NTDP Core – Track Set Up</a:t>
-            </a:r>
-          </a:p>
-        </p:txBody>
-      </p:sp>
-      <p:sp>
-        <p:nvSpPr>
-          <p:cNvPr id="10" name="Rectangle: Rounded Corners 9">
-            <a:extLst>
-              <a:ext uri="{FF2B5EF4-FFF2-40B4-BE49-F238E27FC236}">
-                <a16:creationId xmlns:a16="http://schemas.microsoft.com/office/drawing/2014/main" id="{1774A61D-E998-1E16-D98A-604826C6933C}"/>
-              </a:ext>
-            </a:extLst>
-          </p:cNvPr>
-          <p:cNvSpPr/>
-          <p:nvPr/>
-        </p:nvSpPr>
-        <p:spPr>
-          <a:xfrm>
-            <a:off x="4424382" y="2432019"/>
-            <a:ext cx="1022555" cy="91440"/>
-          </a:xfrm>
-          <a:prstGeom prst="roundRect">
-            <a:avLst>
-              <a:gd name="adj" fmla="val 31717"/>
-            </a:avLst>
-          </a:prstGeom>
-          <a:solidFill>
-            <a:schemeClr val="bg1"/>
-          </a:solidFill>
-          <a:ln>
-            <a:noFill/>
-          </a:ln>
-        </p:spPr>
-        <p:style>
-          <a:lnRef idx="2">
-            <a:schemeClr val="accent1">
-              <a:shade val="15000"/>
-            </a:schemeClr>
-          </a:lnRef>
-          <a:fillRef idx="1">
-            <a:schemeClr val="accent1"/>
-          </a:fillRef>
-          <a:effectRef idx="0">
-            <a:schemeClr val="accent1"/>
-          </a:effectRef>
-          <a:fontRef idx="minor">
-            <a:schemeClr val="lt1"/>
-          </a:fontRef>
-        </p:style>
-        <p:txBody>
-          <a:bodyPr rtlCol="0" anchor="ctr"/>
-          <a:lstStyle/>
-          <a:p>
-            <a:pPr marL="0" marR="0" lvl="0" indent="0" algn="l" defTabSz="914400" rtl="0" eaLnBrk="1" fontAlgn="auto" latinLnBrk="0" hangingPunct="1">
-              <a:lnSpc>
-                <a:spcPct val="100000"/>
-              </a:lnSpc>
-              <a:spcBef>
-                <a:spcPts val="0"/>
-              </a:spcBef>
-              <a:spcAft>
-                <a:spcPts val="0"/>
-              </a:spcAft>
-              <a:buClrTx/>
-              <a:buSzTx/>
-              <a:buFontTx/>
-              <a:buNone/>
-              <a:tabLst/>
-              <a:defRPr/>
-            </a:pPr>
-            <a:r>
-              <a:rPr kumimoji="0" lang="en-US" sz="800" b="0" i="0" u="none" strike="noStrike" kern="1200" cap="none" spc="0" normalizeH="0" baseline="0" noProof="0" dirty="0">
-                <a:ln>
-                  <a:noFill/>
-                </a:ln>
-                <a:solidFill>
-                  <a:prstClr val="black"/>
-                </a:solidFill>
-                <a:effectLst/>
-                <a:uLnTx/>
-                <a:uFillTx/>
-                <a:latin typeface="Calibri" panose="020F0502020204030204"/>
-                <a:ea typeface="+mn-ea"/>
-                <a:cs typeface="+mn-cs"/>
-              </a:rPr>
-              <a:t>NTDP Core Track</a:t>
-            </a:r>
-          </a:p>
-        </p:txBody>
-      </p:sp>
-      <p:sp>
-        <p:nvSpPr>
-          <p:cNvPr id="11" name="Rectangle: Rounded Corners 10">
-            <a:extLst>
-              <a:ext uri="{FF2B5EF4-FFF2-40B4-BE49-F238E27FC236}">
-                <a16:creationId xmlns:a16="http://schemas.microsoft.com/office/drawing/2014/main" id="{2E0AAE9E-DEA6-E4B6-4C7A-C706D704F954}"/>
-              </a:ext>
-            </a:extLst>
-          </p:cNvPr>
-          <p:cNvSpPr/>
-          <p:nvPr/>
-        </p:nvSpPr>
-        <p:spPr>
-          <a:xfrm>
-            <a:off x="7669377" y="3179429"/>
-            <a:ext cx="548640" cy="137160"/>
-          </a:xfrm>
-          <a:prstGeom prst="roundRect">
-            <a:avLst>
-              <a:gd name="adj" fmla="val 31717"/>
-            </a:avLst>
-          </a:prstGeom>
-          <a:solidFill>
-            <a:schemeClr val="bg1">
-              <a:lumMod val="95000"/>
-            </a:schemeClr>
-          </a:solidFill>
-          <a:ln>
-            <a:noFill/>
-          </a:ln>
-        </p:spPr>
-        <p:style>
-          <a:lnRef idx="2">
-            <a:schemeClr val="accent1">
-              <a:shade val="15000"/>
-            </a:schemeClr>
-          </a:lnRef>
-          <a:fillRef idx="1">
-            <a:schemeClr val="accent1"/>
-          </a:fillRef>
-          <a:effectRef idx="0">
-            <a:schemeClr val="accent1"/>
-          </a:effectRef>
-          <a:fontRef idx="minor">
-            <a:schemeClr val="lt1"/>
-          </a:fontRef>
-        </p:style>
-        <p:txBody>
-          <a:bodyPr rtlCol="0" anchor="ctr"/>
-          <a:lstStyle/>
-          <a:p>
-            <a:pPr marL="0" marR="0" lvl="0" indent="0" algn="l" defTabSz="914400" rtl="0" eaLnBrk="1" fontAlgn="auto" latinLnBrk="0" hangingPunct="1">
-              <a:lnSpc>
-                <a:spcPct val="100000"/>
-              </a:lnSpc>
-              <a:spcBef>
-                <a:spcPts val="0"/>
-              </a:spcBef>
-              <a:spcAft>
-                <a:spcPts val="0"/>
-              </a:spcAft>
-              <a:buClrTx/>
-              <a:buSzTx/>
-              <a:buFontTx/>
-              <a:buNone/>
-              <a:tabLst/>
-              <a:defRPr/>
-            </a:pPr>
-            <a:r>
-              <a:rPr kumimoji="0" lang="en-US" sz="800" b="0" i="0" u="none" strike="noStrike" kern="1200" cap="none" spc="0" normalizeH="0" baseline="0" noProof="0" dirty="0">
-                <a:ln>
-                  <a:noFill/>
-                </a:ln>
-                <a:solidFill>
-                  <a:prstClr val="black"/>
-                </a:solidFill>
-                <a:effectLst/>
-                <a:uLnTx/>
-                <a:uFillTx/>
-                <a:latin typeface="Calibri" panose="020F0502020204030204"/>
-                <a:ea typeface="+mn-ea"/>
-                <a:cs typeface="+mn-cs"/>
-              </a:rPr>
-              <a:t>Track</a:t>
-            </a:r>
-          </a:p>
-        </p:txBody>
-      </p:sp>
-      <p:sp>
-        <p:nvSpPr>
-          <p:cNvPr id="13" name="Rectangle: Rounded Corners 12">
-            <a:extLst>
-              <a:ext uri="{FF2B5EF4-FFF2-40B4-BE49-F238E27FC236}">
-                <a16:creationId xmlns:a16="http://schemas.microsoft.com/office/drawing/2014/main" id="{5730A519-C01C-854F-D3A5-00E8AA246388}"/>
-              </a:ext>
-            </a:extLst>
-          </p:cNvPr>
-          <p:cNvSpPr/>
-          <p:nvPr/>
-        </p:nvSpPr>
-        <p:spPr>
-          <a:xfrm>
-            <a:off x="4449549" y="2581980"/>
-            <a:ext cx="533512" cy="171666"/>
-          </a:xfrm>
-          <a:prstGeom prst="roundRect">
-            <a:avLst/>
-          </a:prstGeom>
-          <a:solidFill>
-            <a:schemeClr val="bg2"/>
-          </a:solidFill>
-          <a:ln>
-            <a:noFill/>
-          </a:ln>
-        </p:spPr>
-        <p:style>
-          <a:lnRef idx="2">
-            <a:schemeClr val="accent1">
-              <a:shade val="15000"/>
-            </a:schemeClr>
-          </a:lnRef>
-          <a:fillRef idx="1">
-            <a:schemeClr val="accent1"/>
-          </a:fillRef>
-          <a:effectRef idx="0">
-            <a:schemeClr val="accent1"/>
-          </a:effectRef>
-          <a:fontRef idx="minor">
-            <a:schemeClr val="lt1"/>
-          </a:fontRef>
-        </p:style>
-        <p:txBody>
-          <a:bodyPr rtlCol="0" anchor="ctr"/>
-          <a:lstStyle/>
-          <a:p>
-            <a:pPr marL="0" marR="0" lvl="0" indent="0" algn="ctr" defTabSz="914400" rtl="0" eaLnBrk="1" fontAlgn="auto" latinLnBrk="0" hangingPunct="1">
-              <a:lnSpc>
-                <a:spcPct val="100000"/>
-              </a:lnSpc>
-              <a:spcBef>
-                <a:spcPts val="0"/>
-              </a:spcBef>
-              <a:spcAft>
-                <a:spcPts val="0"/>
-              </a:spcAft>
-              <a:buClrTx/>
-              <a:buSzTx/>
-              <a:buFontTx/>
-              <a:buNone/>
-              <a:tabLst/>
-              <a:defRPr/>
-            </a:pPr>
-            <a:endParaRPr kumimoji="0" lang="en-US" sz="1800" b="0" i="0" u="none" strike="noStrike" kern="1200" cap="none" spc="0" normalizeH="0" baseline="0" noProof="0" dirty="0">
-              <a:ln>
-                <a:noFill/>
-              </a:ln>
-              <a:solidFill>
-                <a:prstClr val="white"/>
-              </a:solidFill>
-              <a:effectLst/>
-              <a:uLnTx/>
-              <a:uFillTx/>
-              <a:latin typeface="Calibri" panose="020F0502020204030204"/>
-              <a:ea typeface="+mn-ea"/>
-              <a:cs typeface="+mn-cs"/>
-            </a:endParaRPr>
-          </a:p>
-        </p:txBody>
-      </p:sp>
-      <p:sp>
-        <p:nvSpPr>
-          <p:cNvPr id="14" name="Rectangle: Rounded Corners 13">
-            <a:extLst>
-              <a:ext uri="{FF2B5EF4-FFF2-40B4-BE49-F238E27FC236}">
-                <a16:creationId xmlns:a16="http://schemas.microsoft.com/office/drawing/2014/main" id="{731A487C-9EE9-9979-8151-98C3041FD51C}"/>
-              </a:ext>
-            </a:extLst>
-          </p:cNvPr>
-          <p:cNvSpPr/>
-          <p:nvPr/>
-        </p:nvSpPr>
-        <p:spPr>
-          <a:xfrm>
-            <a:off x="4322824" y="3133186"/>
-            <a:ext cx="7460394" cy="1044532"/>
-          </a:xfrm>
-          <a:prstGeom prst="roundRect">
-            <a:avLst>
-              <a:gd name="adj" fmla="val 5723"/>
-            </a:avLst>
-          </a:prstGeom>
-          <a:solidFill>
-            <a:schemeClr val="bg1">
-              <a:lumMod val="95000"/>
-            </a:schemeClr>
-          </a:solidFill>
-          <a:ln>
-            <a:noFill/>
-          </a:ln>
-        </p:spPr>
-        <p:style>
-          <a:lnRef idx="2">
-            <a:schemeClr val="accent1">
-              <a:shade val="15000"/>
-            </a:schemeClr>
-          </a:lnRef>
-          <a:fillRef idx="1">
-            <a:schemeClr val="accent1"/>
-          </a:fillRef>
-          <a:effectRef idx="0">
-            <a:schemeClr val="accent1"/>
-          </a:effectRef>
-          <a:fontRef idx="minor">
-            <a:schemeClr val="lt1"/>
-          </a:fontRef>
-        </p:style>
-        <p:txBody>
-          <a:bodyPr rtlCol="0" anchor="ctr"/>
-          <a:lstStyle/>
-          <a:p>
-            <a:pPr marL="0" marR="0" lvl="0" indent="0" algn="l" defTabSz="914400" rtl="0" eaLnBrk="1" fontAlgn="auto" latinLnBrk="0" hangingPunct="1">
-              <a:lnSpc>
-                <a:spcPct val="100000"/>
-              </a:lnSpc>
-              <a:spcBef>
-                <a:spcPts val="0"/>
-              </a:spcBef>
-              <a:spcAft>
-                <a:spcPts val="0"/>
-              </a:spcAft>
-              <a:buClrTx/>
-              <a:buSzTx/>
-              <a:buFontTx/>
-              <a:buNone/>
-              <a:tabLst/>
-              <a:defRPr/>
-            </a:pPr>
-            <a:endParaRPr kumimoji="0" lang="en-US" sz="800" b="0" i="0" u="none" strike="noStrike" kern="1200" cap="none" spc="0" normalizeH="0" baseline="0" noProof="0" dirty="0">
-              <a:ln>
-                <a:noFill/>
-              </a:ln>
-              <a:solidFill>
-                <a:prstClr val="black"/>
-              </a:solidFill>
-              <a:effectLst/>
-              <a:uLnTx/>
-              <a:uFillTx/>
-              <a:latin typeface="Calibri" panose="020F0502020204030204"/>
-              <a:ea typeface="+mn-ea"/>
-              <a:cs typeface="+mn-cs"/>
-            </a:endParaRPr>
-          </a:p>
-        </p:txBody>
-      </p:sp>
-      <p:pic>
-        <p:nvPicPr>
-          <p:cNvPr id="15" name="Picture 14">
-            <a:extLst>
-              <a:ext uri="{FF2B5EF4-FFF2-40B4-BE49-F238E27FC236}">
-                <a16:creationId xmlns:a16="http://schemas.microsoft.com/office/drawing/2014/main" id="{CADD68B9-FBEE-10B6-5009-A62899A8BC09}"/>
-              </a:ext>
-            </a:extLst>
-          </p:cNvPr>
-          <p:cNvPicPr>
-            <a:picLocks noChangeAspect="1"/>
-          </p:cNvPicPr>
-          <p:nvPr/>
-        </p:nvPicPr>
-        <p:blipFill rotWithShape="1">
-          <a:blip r:embed="rId3"/>
-          <a:srcRect l="25861" t="8880" r="53271" b="49283"/>
-          <a:stretch/>
-        </p:blipFill>
-        <p:spPr>
-          <a:xfrm>
-            <a:off x="5248711" y="342971"/>
-            <a:ext cx="1694577" cy="1076357"/>
-          </a:xfrm>
-          <a:prstGeom prst="rect">
-            <a:avLst/>
-          </a:prstGeom>
-        </p:spPr>
-      </p:pic>
-      <p:sp>
-        <p:nvSpPr>
-          <p:cNvPr id="16" name="Arrow: Down 15">
-            <a:extLst>
-              <a:ext uri="{FF2B5EF4-FFF2-40B4-BE49-F238E27FC236}">
-                <a16:creationId xmlns:a16="http://schemas.microsoft.com/office/drawing/2014/main" id="{22D7EF40-20FA-DFD6-85B7-D656295CA70D}"/>
-              </a:ext>
-            </a:extLst>
-          </p:cNvPr>
-          <p:cNvSpPr/>
-          <p:nvPr/>
-        </p:nvSpPr>
-        <p:spPr>
-          <a:xfrm rot="5400000">
-            <a:off x="6878971" y="342403"/>
-            <a:ext cx="436228" cy="708377"/>
-          </a:xfrm>
-          <a:prstGeom prst="downArrow">
-            <a:avLst>
-              <a:gd name="adj1" fmla="val 30769"/>
-              <a:gd name="adj2" fmla="val 50000"/>
-            </a:avLst>
-          </a:prstGeom>
-        </p:spPr>
-        <p:style>
-          <a:lnRef idx="2">
-            <a:schemeClr val="accent2">
-              <a:shade val="15000"/>
-            </a:schemeClr>
-          </a:lnRef>
-          <a:fillRef idx="1">
-            <a:schemeClr val="accent2"/>
-          </a:fillRef>
-          <a:effectRef idx="0">
-            <a:schemeClr val="accent2"/>
-          </a:effectRef>
-          <a:fontRef idx="minor">
-            <a:schemeClr val="lt1"/>
-          </a:fontRef>
-        </p:style>
-        <p:txBody>
-          <a:bodyPr rtlCol="0" anchor="ctr"/>
-          <a:lstStyle/>
-          <a:p>
-            <a:pPr marL="0" marR="0" lvl="0" indent="0" algn="ctr" defTabSz="914400" rtl="0" eaLnBrk="1" fontAlgn="auto" latinLnBrk="0" hangingPunct="1">
-              <a:lnSpc>
-                <a:spcPct val="100000"/>
-              </a:lnSpc>
-              <a:spcBef>
-                <a:spcPts val="0"/>
-              </a:spcBef>
-              <a:spcAft>
-                <a:spcPts val="0"/>
-              </a:spcAft>
-              <a:buClrTx/>
-              <a:buSzTx/>
-              <a:buFontTx/>
-              <a:buNone/>
-              <a:tabLst/>
-              <a:defRPr/>
-            </a:pPr>
-            <a:endParaRPr kumimoji="0" lang="en-US" sz="1800" b="0" i="0" u="none" strike="noStrike" kern="1200" cap="none" spc="0" normalizeH="0" baseline="0" noProof="0" dirty="0">
-              <a:ln>
-                <a:noFill/>
-              </a:ln>
-              <a:solidFill>
-                <a:prstClr val="white"/>
-              </a:solidFill>
-              <a:effectLst/>
-              <a:uLnTx/>
-              <a:uFillTx/>
-              <a:latin typeface="Calibri" panose="020F0502020204030204"/>
-              <a:ea typeface="+mn-ea"/>
-              <a:cs typeface="+mn-cs"/>
-            </a:endParaRPr>
-          </a:p>
-        </p:txBody>
-      </p:sp>
-      <p:sp>
-        <p:nvSpPr>
-          <p:cNvPr id="17" name="Rectangle: Rounded Corners 16">
-            <a:extLst>
-              <a:ext uri="{FF2B5EF4-FFF2-40B4-BE49-F238E27FC236}">
-                <a16:creationId xmlns:a16="http://schemas.microsoft.com/office/drawing/2014/main" id="{EF9F1291-B1AD-7FD7-5764-8A8F6832E769}"/>
-              </a:ext>
-            </a:extLst>
-          </p:cNvPr>
-          <p:cNvSpPr/>
-          <p:nvPr/>
-        </p:nvSpPr>
-        <p:spPr>
-          <a:xfrm>
-            <a:off x="5720342" y="2432019"/>
-            <a:ext cx="1284465" cy="462182"/>
-          </a:xfrm>
-          <a:prstGeom prst="roundRect">
-            <a:avLst>
-              <a:gd name="adj" fmla="val 0"/>
-            </a:avLst>
-          </a:prstGeom>
-          <a:solidFill>
-            <a:schemeClr val="bg1"/>
-          </a:solidFill>
-          <a:ln>
-            <a:noFill/>
-          </a:ln>
-        </p:spPr>
-        <p:style>
-          <a:lnRef idx="2">
-            <a:schemeClr val="accent1">
-              <a:shade val="15000"/>
-            </a:schemeClr>
-          </a:lnRef>
-          <a:fillRef idx="1">
-            <a:schemeClr val="accent1"/>
-          </a:fillRef>
-          <a:effectRef idx="0">
-            <a:schemeClr val="accent1"/>
-          </a:effectRef>
-          <a:fontRef idx="minor">
-            <a:schemeClr val="lt1"/>
-          </a:fontRef>
-        </p:style>
-        <p:txBody>
-          <a:bodyPr rtlCol="0" anchor="ctr"/>
-          <a:lstStyle/>
-          <a:p>
-            <a:pPr marL="0" marR="0" lvl="0" indent="0" algn="l" defTabSz="914400" rtl="0" eaLnBrk="1" fontAlgn="auto" latinLnBrk="0" hangingPunct="1">
-              <a:lnSpc>
-                <a:spcPct val="100000"/>
-              </a:lnSpc>
-              <a:spcBef>
-                <a:spcPts val="0"/>
-              </a:spcBef>
-              <a:spcAft>
-                <a:spcPts val="0"/>
-              </a:spcAft>
-              <a:buClrTx/>
-              <a:buSzTx/>
-              <a:buFontTx/>
-              <a:buNone/>
-              <a:tabLst/>
-              <a:defRPr/>
-            </a:pPr>
-            <a:endParaRPr kumimoji="0" lang="en-US" sz="800" b="0" i="0" u="none" strike="noStrike" kern="1200" cap="none" spc="0" normalizeH="0" baseline="0" noProof="0" dirty="0">
-              <a:ln>
-                <a:noFill/>
-              </a:ln>
-              <a:solidFill>
-                <a:prstClr val="black"/>
-              </a:solidFill>
-              <a:effectLst/>
-              <a:uLnTx/>
-              <a:uFillTx/>
-              <a:latin typeface="Calibri" panose="020F0502020204030204"/>
-              <a:ea typeface="+mn-ea"/>
-              <a:cs typeface="+mn-cs"/>
-            </a:endParaRPr>
-          </a:p>
-        </p:txBody>
-      </p:sp>
-      <p:sp>
-        <p:nvSpPr>
-          <p:cNvPr id="6" name="Rectangle: Rounded Corners 5">
-            <a:extLst>
-              <a:ext uri="{FF2B5EF4-FFF2-40B4-BE49-F238E27FC236}">
-                <a16:creationId xmlns:a16="http://schemas.microsoft.com/office/drawing/2014/main" id="{946A7418-AD7D-8262-3A69-42EE9A7A9A1F}"/>
-              </a:ext>
-            </a:extLst>
-          </p:cNvPr>
-          <p:cNvSpPr/>
-          <p:nvPr/>
-        </p:nvSpPr>
-        <p:spPr>
-          <a:xfrm>
-            <a:off x="4400950" y="2961520"/>
-            <a:ext cx="1737360" cy="171666"/>
-          </a:xfrm>
-          <a:prstGeom prst="roundRect">
-            <a:avLst/>
-          </a:prstGeom>
-          <a:solidFill>
-            <a:schemeClr val="accent4"/>
-          </a:solidFill>
-          <a:ln>
-            <a:noFill/>
-          </a:ln>
-        </p:spPr>
-        <p:style>
-          <a:lnRef idx="2">
-            <a:schemeClr val="accent1">
-              <a:shade val="15000"/>
-            </a:schemeClr>
-          </a:lnRef>
-          <a:fillRef idx="1">
-            <a:schemeClr val="accent1"/>
-          </a:fillRef>
-          <a:effectRef idx="0">
-            <a:schemeClr val="accent1"/>
-          </a:effectRef>
-          <a:fontRef idx="minor">
-            <a:schemeClr val="lt1"/>
-          </a:fontRef>
-        </p:style>
-        <p:txBody>
-          <a:bodyPr rtlCol="0" anchor="ctr"/>
-          <a:lstStyle/>
-          <a:p>
-            <a:pPr algn="ctr"/>
-            <a:r>
-              <a:rPr lang="en-US" sz="1000" dirty="0">
-                <a:solidFill>
-                  <a:sysClr val="windowText" lastClr="000000"/>
-                </a:solidFill>
-              </a:rPr>
-              <a:t>Create New NTDP Core  Track</a:t>
-            </a:r>
-          </a:p>
-        </p:txBody>
-      </p:sp>
-      <p:sp>
-        <p:nvSpPr>
-          <p:cNvPr id="2" name="Rectangle: Rounded Corners 1">
-            <a:extLst>
-              <a:ext uri="{FF2B5EF4-FFF2-40B4-BE49-F238E27FC236}">
-                <a16:creationId xmlns:a16="http://schemas.microsoft.com/office/drawing/2014/main" id="{6D7D8624-98C0-1FDD-3A85-9EABF5FF6EBE}"/>
-              </a:ext>
-            </a:extLst>
-          </p:cNvPr>
-          <p:cNvSpPr/>
-          <p:nvPr/>
-        </p:nvSpPr>
-        <p:spPr>
-          <a:xfrm>
-            <a:off x="6256549" y="3169355"/>
-            <a:ext cx="856628" cy="705234"/>
-          </a:xfrm>
-          <a:prstGeom prst="roundRect">
-            <a:avLst>
-              <a:gd name="adj" fmla="val 12061"/>
-            </a:avLst>
-          </a:prstGeom>
-          <a:solidFill>
-            <a:schemeClr val="bg1"/>
-          </a:solidFill>
-          <a:ln>
-            <a:solidFill>
-              <a:srgbClr val="7030A0"/>
-            </a:solidFill>
-          </a:ln>
-        </p:spPr>
-        <p:style>
-          <a:lnRef idx="2">
-            <a:schemeClr val="accent1">
-              <a:shade val="15000"/>
-            </a:schemeClr>
-          </a:lnRef>
-          <a:fillRef idx="1">
-            <a:schemeClr val="accent1"/>
-          </a:fillRef>
-          <a:effectRef idx="0">
-            <a:schemeClr val="accent1"/>
-          </a:effectRef>
-          <a:fontRef idx="minor">
-            <a:schemeClr val="lt1"/>
-          </a:fontRef>
-        </p:style>
-        <p:txBody>
-          <a:bodyPr rtlCol="0" anchor="t"/>
-          <a:lstStyle/>
-          <a:p>
-            <a:pPr marL="0" marR="0" lvl="0" indent="0" algn="l" defTabSz="914400" rtl="0" eaLnBrk="1" fontAlgn="auto" latinLnBrk="0" hangingPunct="1">
-              <a:lnSpc>
-                <a:spcPct val="100000"/>
-              </a:lnSpc>
-              <a:spcBef>
-                <a:spcPts val="0"/>
-              </a:spcBef>
-              <a:spcAft>
-                <a:spcPts val="0"/>
-              </a:spcAft>
-              <a:buClrTx/>
-              <a:buSzTx/>
-              <a:buFontTx/>
-              <a:buNone/>
-              <a:tabLst/>
-              <a:defRPr/>
-            </a:pPr>
-            <a:r>
-              <a:rPr kumimoji="0" lang="en-US" sz="800" b="0" i="0" u="none" strike="noStrike" kern="1200" cap="none" spc="0" normalizeH="0" baseline="0" noProof="0" dirty="0">
-                <a:ln>
-                  <a:noFill/>
-                </a:ln>
-                <a:solidFill>
-                  <a:schemeClr val="tx1">
-                    <a:lumMod val="50000"/>
-                    <a:lumOff val="50000"/>
-                  </a:schemeClr>
-                </a:solidFill>
-                <a:effectLst/>
-                <a:uLnTx/>
-                <a:uFillTx/>
-                <a:latin typeface="Calibri" panose="020F0502020204030204"/>
-                <a:ea typeface="+mn-ea"/>
-                <a:cs typeface="+mn-cs"/>
-              </a:rPr>
-              <a:t>Track Status</a:t>
-            </a:r>
-          </a:p>
-        </p:txBody>
-      </p:sp>
-      <p:sp>
-        <p:nvSpPr>
-          <p:cNvPr id="3" name="Rectangle: Rounded Corners 2">
-            <a:extLst>
-              <a:ext uri="{FF2B5EF4-FFF2-40B4-BE49-F238E27FC236}">
-                <a16:creationId xmlns:a16="http://schemas.microsoft.com/office/drawing/2014/main" id="{AA26A66F-536D-43B3-9AD5-4643A2B8FD8C}"/>
-              </a:ext>
-            </a:extLst>
-          </p:cNvPr>
-          <p:cNvSpPr/>
-          <p:nvPr/>
-        </p:nvSpPr>
-        <p:spPr>
-          <a:xfrm>
-            <a:off x="5029516" y="3169355"/>
-            <a:ext cx="1224804" cy="705234"/>
-          </a:xfrm>
-          <a:prstGeom prst="roundRect">
-            <a:avLst>
-              <a:gd name="adj" fmla="val 18092"/>
-            </a:avLst>
-          </a:prstGeom>
-          <a:solidFill>
-            <a:schemeClr val="bg1"/>
-          </a:solidFill>
-          <a:ln>
-            <a:solidFill>
-              <a:srgbClr val="7030A0"/>
-            </a:solidFill>
-          </a:ln>
-        </p:spPr>
-        <p:style>
-          <a:lnRef idx="2">
-            <a:schemeClr val="accent1">
-              <a:shade val="15000"/>
-            </a:schemeClr>
-          </a:lnRef>
-          <a:fillRef idx="1">
-            <a:schemeClr val="accent1"/>
-          </a:fillRef>
-          <a:effectRef idx="0">
-            <a:schemeClr val="accent1"/>
-          </a:effectRef>
-          <a:fontRef idx="minor">
-            <a:schemeClr val="lt1"/>
-          </a:fontRef>
-        </p:style>
-        <p:txBody>
-          <a:bodyPr rtlCol="0" anchor="t"/>
-          <a:lstStyle/>
-          <a:p>
-            <a:pPr marL="0" marR="0" lvl="0" indent="0" algn="l" defTabSz="914400" rtl="0" eaLnBrk="1" fontAlgn="auto" latinLnBrk="0" hangingPunct="1">
-              <a:lnSpc>
-                <a:spcPct val="100000"/>
-              </a:lnSpc>
-              <a:spcBef>
-                <a:spcPts val="0"/>
-              </a:spcBef>
-              <a:spcAft>
-                <a:spcPts val="0"/>
-              </a:spcAft>
-              <a:buClrTx/>
-              <a:buSzTx/>
-              <a:buFontTx/>
-              <a:buNone/>
-              <a:tabLst/>
-              <a:defRPr/>
-            </a:pPr>
-            <a:r>
-              <a:rPr kumimoji="0" lang="en-US" sz="800" b="0" i="0" u="none" strike="noStrike" kern="1200" cap="none" spc="0" normalizeH="0" baseline="0" noProof="0" dirty="0">
-                <a:ln>
-                  <a:noFill/>
-                </a:ln>
-                <a:solidFill>
-                  <a:schemeClr val="tx1">
-                    <a:lumMod val="50000"/>
-                    <a:lumOff val="50000"/>
-                  </a:schemeClr>
-                </a:solidFill>
-                <a:effectLst/>
-                <a:uLnTx/>
-                <a:uFillTx/>
-                <a:latin typeface="Calibri" panose="020F0502020204030204"/>
-                <a:ea typeface="+mn-ea"/>
-                <a:cs typeface="+mn-cs"/>
-              </a:rPr>
-              <a:t>Track Name</a:t>
-            </a:r>
-          </a:p>
-        </p:txBody>
-      </p:sp>
-      <p:sp>
-        <p:nvSpPr>
-          <p:cNvPr id="5" name="Rectangle: Rounded Corners 4">
-            <a:extLst>
-              <a:ext uri="{FF2B5EF4-FFF2-40B4-BE49-F238E27FC236}">
-                <a16:creationId xmlns:a16="http://schemas.microsoft.com/office/drawing/2014/main" id="{394A6153-CA16-8C22-11C7-31B5D4B92E8D}"/>
-              </a:ext>
-            </a:extLst>
-          </p:cNvPr>
-          <p:cNvSpPr/>
-          <p:nvPr/>
-        </p:nvSpPr>
-        <p:spPr>
-          <a:xfrm>
-            <a:off x="4407880" y="3169355"/>
-            <a:ext cx="618899" cy="705234"/>
-          </a:xfrm>
-          <a:prstGeom prst="roundRect">
-            <a:avLst>
-              <a:gd name="adj" fmla="val 19268"/>
-            </a:avLst>
-          </a:prstGeom>
-          <a:solidFill>
-            <a:schemeClr val="bg1"/>
-          </a:solidFill>
-          <a:ln>
-            <a:solidFill>
-              <a:srgbClr val="7030A0"/>
-            </a:solidFill>
-          </a:ln>
-        </p:spPr>
-        <p:style>
-          <a:lnRef idx="2">
-            <a:schemeClr val="accent1">
-              <a:shade val="15000"/>
-            </a:schemeClr>
-          </a:lnRef>
-          <a:fillRef idx="1">
-            <a:schemeClr val="accent1"/>
-          </a:fillRef>
-          <a:effectRef idx="0">
-            <a:schemeClr val="accent1"/>
-          </a:effectRef>
-          <a:fontRef idx="minor">
-            <a:schemeClr val="lt1"/>
-          </a:fontRef>
-        </p:style>
-        <p:txBody>
-          <a:bodyPr rtlCol="0" anchor="t"/>
-          <a:lstStyle/>
-          <a:p>
-            <a:pPr marL="0" marR="0" lvl="0" indent="0" algn="l" defTabSz="914400" rtl="0" eaLnBrk="1" fontAlgn="auto" latinLnBrk="0" hangingPunct="1">
-              <a:lnSpc>
-                <a:spcPct val="100000"/>
-              </a:lnSpc>
-              <a:spcBef>
-                <a:spcPts val="0"/>
-              </a:spcBef>
-              <a:spcAft>
-                <a:spcPts val="0"/>
-              </a:spcAft>
-              <a:buClrTx/>
-              <a:buSzTx/>
-              <a:buFontTx/>
-              <a:buNone/>
-              <a:tabLst/>
-              <a:defRPr/>
-            </a:pPr>
-            <a:r>
-              <a:rPr kumimoji="0" lang="en-US" sz="800" b="0" i="0" u="none" strike="noStrike" kern="1200" cap="none" spc="0" normalizeH="0" baseline="0" noProof="0" dirty="0">
-                <a:ln>
-                  <a:noFill/>
-                </a:ln>
-                <a:solidFill>
-                  <a:schemeClr val="tx1">
-                    <a:lumMod val="50000"/>
-                    <a:lumOff val="50000"/>
-                  </a:schemeClr>
-                </a:solidFill>
-                <a:effectLst/>
-                <a:uLnTx/>
-                <a:uFillTx/>
-                <a:latin typeface="Calibri" panose="020F0502020204030204"/>
-                <a:ea typeface="+mn-ea"/>
-                <a:cs typeface="+mn-cs"/>
-              </a:rPr>
-              <a:t>Track ID</a:t>
-            </a:r>
-          </a:p>
-        </p:txBody>
-      </p:sp>
-      <p:sp>
-        <p:nvSpPr>
-          <p:cNvPr id="9" name="Rectangle: Rounded Corners 8">
-            <a:extLst>
-              <a:ext uri="{FF2B5EF4-FFF2-40B4-BE49-F238E27FC236}">
-                <a16:creationId xmlns:a16="http://schemas.microsoft.com/office/drawing/2014/main" id="{AE28C9D1-B634-B329-0588-CBA913ABE5B2}"/>
-              </a:ext>
-            </a:extLst>
-          </p:cNvPr>
-          <p:cNvSpPr/>
-          <p:nvPr/>
-        </p:nvSpPr>
-        <p:spPr>
-          <a:xfrm>
-            <a:off x="7214186" y="3402422"/>
-            <a:ext cx="590107" cy="171666"/>
-          </a:xfrm>
-          <a:prstGeom prst="roundRect">
-            <a:avLst/>
-          </a:prstGeom>
-          <a:solidFill>
-            <a:srgbClr val="00B0F0"/>
-          </a:solidFill>
-          <a:ln>
-            <a:noFill/>
-          </a:ln>
-        </p:spPr>
-        <p:style>
-          <a:lnRef idx="2">
-            <a:schemeClr val="accent1">
-              <a:shade val="15000"/>
-            </a:schemeClr>
-          </a:lnRef>
-          <a:fillRef idx="1">
-            <a:schemeClr val="accent1"/>
-          </a:fillRef>
-          <a:effectRef idx="0">
-            <a:schemeClr val="accent1"/>
-          </a:effectRef>
-          <a:fontRef idx="minor">
-            <a:schemeClr val="lt1"/>
-          </a:fontRef>
-        </p:style>
-        <p:txBody>
-          <a:bodyPr rtlCol="0" anchor="ctr"/>
-          <a:lstStyle/>
-          <a:p>
-            <a:pPr algn="ctr"/>
-            <a:r>
-              <a:rPr lang="en-US" sz="1100" dirty="0"/>
-              <a:t>Edit</a:t>
-            </a:r>
-          </a:p>
-        </p:txBody>
-      </p:sp>
-      <p:sp>
-        <p:nvSpPr>
-          <p:cNvPr id="12" name="Rectangle: Rounded Corners 11">
-            <a:extLst>
-              <a:ext uri="{FF2B5EF4-FFF2-40B4-BE49-F238E27FC236}">
-                <a16:creationId xmlns:a16="http://schemas.microsoft.com/office/drawing/2014/main" id="{65BEEF6C-C56D-B64F-0D31-8185F2681B2A}"/>
-              </a:ext>
-            </a:extLst>
-          </p:cNvPr>
-          <p:cNvSpPr/>
-          <p:nvPr/>
-        </p:nvSpPr>
-        <p:spPr>
-          <a:xfrm>
-            <a:off x="7208865" y="3630337"/>
-            <a:ext cx="590107" cy="171666"/>
-          </a:xfrm>
-          <a:prstGeom prst="roundRect">
-            <a:avLst/>
-          </a:prstGeom>
-          <a:solidFill>
-            <a:srgbClr val="00B0F0"/>
-          </a:solidFill>
-          <a:ln>
-            <a:noFill/>
-          </a:ln>
-        </p:spPr>
-        <p:style>
-          <a:lnRef idx="2">
-            <a:schemeClr val="accent1">
-              <a:shade val="15000"/>
-            </a:schemeClr>
-          </a:lnRef>
-          <a:fillRef idx="1">
-            <a:schemeClr val="accent1"/>
-          </a:fillRef>
-          <a:effectRef idx="0">
-            <a:schemeClr val="accent1"/>
-          </a:effectRef>
-          <a:fontRef idx="minor">
-            <a:schemeClr val="lt1"/>
-          </a:fontRef>
-        </p:style>
-        <p:txBody>
-          <a:bodyPr rtlCol="0" anchor="ctr"/>
-          <a:lstStyle/>
-          <a:p>
-            <a:pPr algn="ctr"/>
-            <a:r>
-              <a:rPr lang="en-US" sz="1100" dirty="0"/>
-              <a:t>Edit</a:t>
-            </a:r>
-          </a:p>
-        </p:txBody>
-      </p:sp>
-      <p:sp>
-        <p:nvSpPr>
-          <p:cNvPr id="18" name="Rectangle 17">
-            <a:extLst>
-              <a:ext uri="{FF2B5EF4-FFF2-40B4-BE49-F238E27FC236}">
-                <a16:creationId xmlns:a16="http://schemas.microsoft.com/office/drawing/2014/main" id="{12F6A939-A0FC-A7AD-1A40-9DA3016A7182}"/>
-              </a:ext>
-            </a:extLst>
-          </p:cNvPr>
-          <p:cNvSpPr/>
-          <p:nvPr/>
-        </p:nvSpPr>
-        <p:spPr>
-          <a:xfrm>
-            <a:off x="243281" y="209725"/>
-            <a:ext cx="11241247" cy="6305304"/>
-          </a:xfrm>
-          <a:prstGeom prst="rect">
-            <a:avLst/>
-          </a:prstGeom>
-        </p:spPr>
-        <p:style>
-          <a:lnRef idx="2">
-            <a:schemeClr val="accent1">
-              <a:shade val="15000"/>
-            </a:schemeClr>
-          </a:lnRef>
-          <a:fillRef idx="1">
-            <a:schemeClr val="accent1"/>
-          </a:fillRef>
-          <a:effectRef idx="0">
-            <a:schemeClr val="accent1"/>
-          </a:effectRef>
-          <a:fontRef idx="minor">
-            <a:schemeClr val="lt1"/>
-          </a:fontRef>
-        </p:style>
-        <p:txBody>
-          <a:bodyPr rtlCol="0" anchor="ctr"/>
-          <a:lstStyle/>
-          <a:p>
-            <a:pPr algn="ctr"/>
-            <a:r>
-              <a:rPr lang="en-US" dirty="0"/>
-              <a:t>search</a:t>
-            </a:r>
-          </a:p>
-        </p:txBody>
-      </p:sp>
-    </p:spTree>
-    <p:extLst>
-      <p:ext uri="{BB962C8B-B14F-4D97-AF65-F5344CB8AC3E}">
-        <p14:creationId xmlns:p14="http://schemas.microsoft.com/office/powerpoint/2010/main" val="1046344349"/>
-      </p:ext>
-    </p:extLst>
-  </p:cSld>
-  <p:clrMapOvr>
-    <a:masterClrMapping/>
-  </p:clrMapOvr>
-</p:sld>
-</file>
-
 <file path=ppt/theme/theme1.xml><?xml version="1.0" encoding="utf-8"?>
 <a:theme xmlns:a="http://schemas.openxmlformats.org/drawingml/2006/main" name="Office Theme">
   <a:themeElements>

</xml_diff>